<commit_message>
BugFixes and Design Level2
</commit_message>
<xml_diff>
--- a/Documentation/Präsentation.pptx
+++ b/Documentation/Präsentation.pptx
@@ -4440,7 +4440,7 @@
             </a:r>
           </a:p>
           <a:p>
-            <a:pPr marL="457200" lvl="1" indent="0">
+            <a:pPr marL="0" indent="0">
               <a:lnSpc>
                 <a:spcPct val="150000"/>
               </a:lnSpc>
@@ -4448,7 +4448,7 @@
             </a:pPr>
             <a:r>
               <a:rPr lang="en-US" sz="2000" dirty="0"/>
-              <a:t>Feature- &amp; </a:t>
+              <a:t>	Feature- &amp; </a:t>
             </a:r>
             <a:r>
               <a:rPr lang="en-US" sz="2000" dirty="0" err="1"/>
@@ -4531,11 +4531,9 @@
             </a:r>
             <a:r>
               <a:rPr lang="en-US" sz="2000" dirty="0">
-                <a:solidFill>
-                  <a:schemeClr val="accent2"/>
-                </a:solidFill>
+                <a:hlinkClick r:id="rId3"/>
               </a:rPr>
-              <a:t>blank</a:t>
+              <a:t>huberpa85956@th-nuernberg.de</a:t>
             </a:r>
             <a:r>
               <a:rPr lang="en-US" sz="2000" dirty="0"/>
@@ -4543,19 +4541,21 @@
             </a:r>
           </a:p>
           <a:p>
-            <a:pPr lvl="1">
+            <a:pPr marL="0" indent="0">
               <a:lnSpc>
                 <a:spcPct val="150000"/>
               </a:lnSpc>
+              <a:buNone/>
             </a:pPr>
             <a:r>
-              <a:rPr lang="en-US" sz="2000" dirty="0">
-                <a:solidFill>
-                  <a:schemeClr val="accent2"/>
-                </a:solidFill>
-              </a:rPr>
-              <a:t>Blank</a:t>
-            </a:r>
+              <a:rPr lang="en-US" sz="2000" dirty="0"/>
+              <a:t>	Designer, </a:t>
+            </a:r>
+            <a:r>
+              <a:rPr lang="en-US" sz="2000" dirty="0" err="1"/>
+              <a:t>Featureentwickler</a:t>
+            </a:r>
+            <a:endParaRPr lang="en-US" sz="2000" dirty="0"/>
           </a:p>
           <a:p>
             <a:pPr>
@@ -4580,7 +4580,7 @@
                 <a:solidFill>
                   <a:schemeClr val="accent2"/>
                 </a:solidFill>
-                <a:hlinkClick r:id="rId3"/>
+                <a:hlinkClick r:id="rId4"/>
               </a:rPr>
               <a:t>neumannvi84434@th-nuernberg.de</a:t>
             </a:r>
@@ -4754,7 +4754,7 @@
           <p:nvPr/>
         </p:nvPicPr>
         <p:blipFill>
-          <a:blip r:embed="rId4">
+          <a:blip r:embed="rId5">
             <a:extLst>
               <a:ext uri="{28A0092B-C50C-407E-A947-70E740481C1C}">
                 <a14:useLocalDpi xmlns:a14="http://schemas.microsoft.com/office/drawing/2010/main" val="0"/>

</xml_diff>

<commit_message>
fixed bug for highscore list entry and adjusted chapter spawn in endless
</commit_message>
<xml_diff>
--- a/Documentation/Präsentation.pptx
+++ b/Documentation/Präsentation.pptx
@@ -263,7 +263,7 @@
           <a:p>
             <a:fld id="{299D2EC8-FD75-494B-956B-0BD0D9014E14}" type="datetimeFigureOut">
               <a:rPr lang="de-DE" smtClean="0"/>
-              <a:t>12.01.2022</a:t>
+              <a:t>15.01.2022</a:t>
             </a:fld>
             <a:endParaRPr lang="de-DE"/>
           </a:p>
@@ -461,7 +461,7 @@
           <a:p>
             <a:fld id="{299D2EC8-FD75-494B-956B-0BD0D9014E14}" type="datetimeFigureOut">
               <a:rPr lang="de-DE" smtClean="0"/>
-              <a:t>12.01.2022</a:t>
+              <a:t>15.01.2022</a:t>
             </a:fld>
             <a:endParaRPr lang="de-DE"/>
           </a:p>
@@ -669,7 +669,7 @@
           <a:p>
             <a:fld id="{299D2EC8-FD75-494B-956B-0BD0D9014E14}" type="datetimeFigureOut">
               <a:rPr lang="de-DE" smtClean="0"/>
-              <a:t>12.01.2022</a:t>
+              <a:t>15.01.2022</a:t>
             </a:fld>
             <a:endParaRPr lang="de-DE"/>
           </a:p>
@@ -867,7 +867,7 @@
           <a:p>
             <a:fld id="{299D2EC8-FD75-494B-956B-0BD0D9014E14}" type="datetimeFigureOut">
               <a:rPr lang="de-DE" smtClean="0"/>
-              <a:t>12.01.2022</a:t>
+              <a:t>15.01.2022</a:t>
             </a:fld>
             <a:endParaRPr lang="de-DE"/>
           </a:p>
@@ -1142,7 +1142,7 @@
           <a:p>
             <a:fld id="{299D2EC8-FD75-494B-956B-0BD0D9014E14}" type="datetimeFigureOut">
               <a:rPr lang="de-DE" smtClean="0"/>
-              <a:t>12.01.2022</a:t>
+              <a:t>15.01.2022</a:t>
             </a:fld>
             <a:endParaRPr lang="de-DE"/>
           </a:p>
@@ -1407,7 +1407,7 @@
           <a:p>
             <a:fld id="{299D2EC8-FD75-494B-956B-0BD0D9014E14}" type="datetimeFigureOut">
               <a:rPr lang="de-DE" smtClean="0"/>
-              <a:t>12.01.2022</a:t>
+              <a:t>15.01.2022</a:t>
             </a:fld>
             <a:endParaRPr lang="de-DE"/>
           </a:p>
@@ -1819,7 +1819,7 @@
           <a:p>
             <a:fld id="{299D2EC8-FD75-494B-956B-0BD0D9014E14}" type="datetimeFigureOut">
               <a:rPr lang="de-DE" smtClean="0"/>
-              <a:t>12.01.2022</a:t>
+              <a:t>15.01.2022</a:t>
             </a:fld>
             <a:endParaRPr lang="de-DE"/>
           </a:p>
@@ -1960,7 +1960,7 @@
           <a:p>
             <a:fld id="{299D2EC8-FD75-494B-956B-0BD0D9014E14}" type="datetimeFigureOut">
               <a:rPr lang="de-DE" smtClean="0"/>
-              <a:t>12.01.2022</a:t>
+              <a:t>15.01.2022</a:t>
             </a:fld>
             <a:endParaRPr lang="de-DE"/>
           </a:p>
@@ -2073,7 +2073,7 @@
           <a:p>
             <a:fld id="{299D2EC8-FD75-494B-956B-0BD0D9014E14}" type="datetimeFigureOut">
               <a:rPr lang="de-DE" smtClean="0"/>
-              <a:t>12.01.2022</a:t>
+              <a:t>15.01.2022</a:t>
             </a:fld>
             <a:endParaRPr lang="de-DE"/>
           </a:p>
@@ -2384,7 +2384,7 @@
           <a:p>
             <a:fld id="{299D2EC8-FD75-494B-956B-0BD0D9014E14}" type="datetimeFigureOut">
               <a:rPr lang="de-DE" smtClean="0"/>
-              <a:t>12.01.2022</a:t>
+              <a:t>15.01.2022</a:t>
             </a:fld>
             <a:endParaRPr lang="de-DE"/>
           </a:p>
@@ -2672,7 +2672,7 @@
           <a:p>
             <a:fld id="{299D2EC8-FD75-494B-956B-0BD0D9014E14}" type="datetimeFigureOut">
               <a:rPr lang="de-DE" smtClean="0"/>
-              <a:t>12.01.2022</a:t>
+              <a:t>15.01.2022</a:t>
             </a:fld>
             <a:endParaRPr lang="de-DE"/>
           </a:p>
@@ -2913,7 +2913,7 @@
           <a:p>
             <a:fld id="{299D2EC8-FD75-494B-956B-0BD0D9014E14}" type="datetimeFigureOut">
               <a:rPr lang="de-DE" smtClean="0"/>
-              <a:t>12.01.2022</a:t>
+              <a:t>15.01.2022</a:t>
             </a:fld>
             <a:endParaRPr lang="de-DE"/>
           </a:p>
@@ -4090,7 +4090,7 @@
                 </a:solidFill>
                 <a:latin typeface="Unispace" panose="02000809060000020004" pitchFamily="49" charset="0"/>
               </a:rPr>
-              <a:t> hast </a:t>
+              <a:t> hast, </a:t>
             </a:r>
             <a:r>
               <a:rPr lang="en-US" sz="1600" dirty="0" err="1">
@@ -4376,7 +4376,7 @@
         </p:nvSpPr>
         <p:spPr>
           <a:xfrm>
-            <a:off x="426436" y="563477"/>
+            <a:off x="302564" y="563477"/>
             <a:ext cx="9431010" cy="5731044"/>
           </a:xfrm>
         </p:spPr>
@@ -4393,22 +4393,10 @@
               <a:buNone/>
             </a:pPr>
             <a:r>
-              <a:rPr lang="en-US" sz="2400" i="1" dirty="0" err="1"/>
-              <a:t>Teammitglieder</a:t>
-            </a:r>
-            <a:r>
-              <a:rPr lang="en-US" sz="2400" i="1" dirty="0"/>
-              <a:t> &amp; </a:t>
-            </a:r>
-            <a:r>
-              <a:rPr lang="en-US" sz="2400" i="1" dirty="0" err="1"/>
-              <a:t>Aufgabenbereich</a:t>
-            </a:r>
-            <a:r>
-              <a:rPr lang="en-US" sz="2400" i="1" dirty="0"/>
-              <a:t>:</a:t>
-            </a:r>
-            <a:endParaRPr lang="en-US" sz="2400" dirty="0"/>
+              <a:rPr lang="de-DE" sz="2400" i="1" dirty="0"/>
+              <a:t>Teammitglieder &amp; Aufgabenbereich:</a:t>
+            </a:r>
+            <a:endParaRPr lang="de-DE" sz="2400" dirty="0"/>
           </a:p>
           <a:p>
             <a:pPr>
@@ -4417,25 +4405,17 @@
               </a:lnSpc>
             </a:pPr>
             <a:r>
-              <a:rPr lang="en-US" sz="2000" dirty="0"/>
-              <a:t>Nguyen David (</a:t>
-            </a:r>
-            <a:r>
-              <a:rPr lang="en-US" sz="2000" dirty="0" err="1"/>
-              <a:t>Medieninformatik</a:t>
-            </a:r>
-            <a:r>
-              <a:rPr lang="en-US" sz="2000" dirty="0"/>
-              <a:t>, </a:t>
-            </a:r>
-            <a:r>
-              <a:rPr lang="en-US" sz="2000" dirty="0">
+              <a:rPr lang="de-DE" sz="1900" dirty="0"/>
+              <a:t>Nguyen David (Medieninformatik, </a:t>
+            </a:r>
+            <a:r>
+              <a:rPr lang="de-DE" sz="1900" dirty="0">
                 <a:hlinkClick r:id="rId2"/>
               </a:rPr>
               <a:t>nguyenda81452@th-nuernberg.de</a:t>
             </a:r>
             <a:r>
-              <a:rPr lang="en-US" sz="2000" dirty="0"/>
+              <a:rPr lang="de-DE" sz="1900" dirty="0"/>
               <a:t>):</a:t>
             </a:r>
           </a:p>
@@ -4447,14 +4427,25 @@
               <a:buNone/>
             </a:pPr>
             <a:r>
-              <a:rPr lang="en-US" sz="2000" dirty="0"/>
+              <a:rPr lang="de-DE" sz="1900" dirty="0"/>
               <a:t>	Feature- &amp; </a:t>
             </a:r>
             <a:r>
-              <a:rPr lang="en-US" sz="2000" dirty="0" err="1"/>
+              <a:rPr lang="de-DE" sz="1900" dirty="0" err="1"/>
               <a:t>Engineentwickler</a:t>
             </a:r>
-            <a:endParaRPr lang="en-US" sz="2000" dirty="0"/>
+            <a:r>
+              <a:rPr lang="de-DE" sz="1900" dirty="0"/>
+              <a:t>, Teamleader, </a:t>
+            </a:r>
+            <a:r>
+              <a:rPr lang="de-DE" sz="1900" dirty="0" err="1"/>
+              <a:t>Git</a:t>
+            </a:r>
+            <a:r>
+              <a:rPr lang="de-DE" sz="1900" dirty="0"/>
+              <a:t>-Admin</a:t>
+            </a:r>
           </a:p>
           <a:p>
             <a:pPr>
@@ -4463,53 +4454,48 @@
               </a:lnSpc>
             </a:pPr>
             <a:r>
-              <a:rPr lang="en-US" sz="2000" dirty="0" err="1"/>
+              <a:rPr lang="de-DE" sz="1900" dirty="0" err="1"/>
               <a:t>Volkinsthein</a:t>
             </a:r>
             <a:r>
-              <a:rPr lang="en-US" sz="2000" dirty="0"/>
-              <a:t> Elizabeth (</a:t>
-            </a:r>
-            <a:r>
-              <a:rPr lang="en-US" sz="2000" dirty="0" err="1"/>
-              <a:t>Medieninformatik</a:t>
-            </a:r>
-            <a:r>
-              <a:rPr lang="en-US" sz="2000" dirty="0"/>
-              <a:t>, </a:t>
-            </a:r>
-            <a:r>
-              <a:rPr lang="en-US" sz="1800" dirty="0">
-                <a:solidFill>
-                  <a:schemeClr val="accent2"/>
-                </a:solidFill>
+              <a:rPr lang="de-DE" sz="1900" dirty="0"/>
+              <a:t> Elizabeth (Medieninformatik, </a:t>
+            </a:r>
+            <a:r>
+              <a:rPr lang="de-DE" sz="1900" dirty="0">
+                <a:hlinkClick r:id="rId3"/>
               </a:rPr>
               <a:t>volkinshteinel84659@th-nuernberg.de</a:t>
             </a:r>
             <a:r>
-              <a:rPr lang="en-US" sz="2000" dirty="0"/>
+              <a:rPr lang="de-DE" sz="1900" dirty="0"/>
               <a:t>):</a:t>
             </a:r>
           </a:p>
           <a:p>
-            <a:pPr lvl="1">
+            <a:pPr marL="457200" lvl="1" indent="0">
               <a:lnSpc>
                 <a:spcPct val="150000"/>
               </a:lnSpc>
+              <a:buNone/>
             </a:pPr>
             <a:r>
-              <a:rPr lang="en-US" sz="2000" dirty="0" err="1">
+              <a:rPr lang="de-DE" sz="1900" dirty="0">
                 <a:solidFill>
                   <a:schemeClr val="accent2"/>
                 </a:solidFill>
               </a:rPr>
+              <a:t>	</a:t>
+            </a:r>
+            <a:r>
+              <a:rPr lang="de-DE" sz="1900" dirty="0"/>
+              <a:t> Feature- &amp; </a:t>
+            </a:r>
+            <a:r>
+              <a:rPr lang="de-DE" sz="1900" dirty="0" err="1"/>
               <a:t>Engineentwicklerin</a:t>
             </a:r>
-            <a:endParaRPr lang="en-US" sz="2000" dirty="0">
-              <a:solidFill>
-                <a:schemeClr val="accent2"/>
-              </a:solidFill>
-            </a:endParaRPr>
+            <a:endParaRPr lang="de-DE" sz="1900" dirty="0"/>
           </a:p>
           <a:p>
             <a:pPr>
@@ -4518,25 +4504,17 @@
               </a:lnSpc>
             </a:pPr>
             <a:r>
-              <a:rPr lang="en-US" sz="2000" dirty="0"/>
-              <a:t>Huber Patrick (</a:t>
-            </a:r>
-            <a:r>
-              <a:rPr lang="en-US" sz="2000" dirty="0" err="1"/>
-              <a:t>Medieninformatik</a:t>
-            </a:r>
-            <a:r>
-              <a:rPr lang="en-US" sz="2000" dirty="0"/>
-              <a:t>, </a:t>
-            </a:r>
-            <a:r>
-              <a:rPr lang="en-US" sz="2000" dirty="0">
-                <a:hlinkClick r:id="rId3"/>
+              <a:rPr lang="de-DE" sz="1900" dirty="0"/>
+              <a:t>Huber Patrick (Medieninformatik, </a:t>
+            </a:r>
+            <a:r>
+              <a:rPr lang="de-DE" sz="1900" dirty="0">
+                <a:hlinkClick r:id="rId4"/>
               </a:rPr>
               <a:t>huberpa85956@th-nuernberg.de</a:t>
             </a:r>
             <a:r>
-              <a:rPr lang="en-US" sz="2000" dirty="0"/>
+              <a:rPr lang="de-DE" sz="1900" dirty="0"/>
               <a:t>):</a:t>
             </a:r>
           </a:p>
@@ -4548,14 +4526,14 @@
               <a:buNone/>
             </a:pPr>
             <a:r>
-              <a:rPr lang="en-US" sz="2000" dirty="0"/>
-              <a:t>	Designer, </a:t>
-            </a:r>
-            <a:r>
-              <a:rPr lang="en-US" sz="2000" dirty="0" err="1"/>
+              <a:rPr lang="de-DE" sz="1900" dirty="0"/>
+              <a:t>	Lead-Designer (Level, Sprites), </a:t>
+            </a:r>
+            <a:r>
+              <a:rPr lang="de-DE" sz="1900" dirty="0" err="1"/>
               <a:t>Featureentwickler</a:t>
             </a:r>
-            <a:endParaRPr lang="en-US" sz="2000" dirty="0"/>
+            <a:endParaRPr lang="de-DE" sz="1900" dirty="0"/>
           </a:p>
           <a:p>
             <a:pPr>
@@ -4564,50 +4542,50 @@
               </a:lnSpc>
             </a:pPr>
             <a:r>
-              <a:rPr lang="en-US" sz="2000" dirty="0"/>
-              <a:t>Neumann Vincent (</a:t>
-            </a:r>
-            <a:r>
-              <a:rPr lang="en-US" sz="2000" dirty="0" err="1"/>
-              <a:t>Medieninformatik</a:t>
-            </a:r>
-            <a:r>
-              <a:rPr lang="en-US" sz="2000" dirty="0"/>
-              <a:t>, </a:t>
-            </a:r>
-            <a:r>
-              <a:rPr lang="en-US" sz="2000" dirty="0">
+              <a:rPr lang="de-DE" sz="1900" dirty="0"/>
+              <a:t>Neumann Vincent (Medieninformatik, </a:t>
+            </a:r>
+            <a:r>
+              <a:rPr lang="de-DE" sz="1900" dirty="0">
                 <a:solidFill>
                   <a:schemeClr val="accent2"/>
                 </a:solidFill>
-                <a:hlinkClick r:id="rId4"/>
+                <a:hlinkClick r:id="rId5"/>
               </a:rPr>
               <a:t>neumannvi84434@th-nuernberg.de</a:t>
             </a:r>
             <a:r>
-              <a:rPr lang="en-US" sz="2000" dirty="0"/>
+              <a:rPr lang="de-DE" sz="1900" dirty="0"/>
               <a:t>):</a:t>
             </a:r>
           </a:p>
           <a:p>
-            <a:pPr lvl="1">
+            <a:pPr marL="457200" lvl="1" indent="0">
               <a:lnSpc>
                 <a:spcPct val="150000"/>
               </a:lnSpc>
+              <a:buNone/>
             </a:pPr>
             <a:r>
-              <a:rPr lang="en-US" sz="2000" dirty="0" err="1">
+              <a:rPr lang="de-DE" sz="1900" dirty="0">
                 <a:solidFill>
                   <a:schemeClr val="accent2"/>
                 </a:solidFill>
               </a:rPr>
+              <a:t>	</a:t>
+            </a:r>
+            <a:r>
+              <a:rPr lang="de-DE" sz="1900" dirty="0"/>
+              <a:t> Feature- &amp; </a:t>
+            </a:r>
+            <a:r>
+              <a:rPr lang="de-DE" sz="1900" dirty="0" err="1"/>
               <a:t>Engineentwickler</a:t>
             </a:r>
-            <a:endParaRPr lang="en-US" sz="2000" dirty="0">
-              <a:solidFill>
-                <a:schemeClr val="accent2"/>
-              </a:solidFill>
-            </a:endParaRPr>
+            <a:r>
+              <a:rPr lang="de-DE" sz="1900" dirty="0"/>
+              <a:t>, System Maintenance</a:t>
+            </a:r>
           </a:p>
         </p:txBody>
       </p:sp>
@@ -4754,7 +4732,7 @@
           <p:nvPr/>
         </p:nvPicPr>
         <p:blipFill>
-          <a:blip r:embed="rId5">
+          <a:blip r:embed="rId6">
             <a:extLst>
               <a:ext uri="{28A0092B-C50C-407E-A947-70E740481C1C}">
                 <a14:useLocalDpi xmlns:a14="http://schemas.microsoft.com/office/drawing/2010/main" val="0"/>
@@ -4897,7 +4875,7 @@
             </a:r>
             <a:r>
               <a:rPr lang="en-US" sz="2400" dirty="0"/>
-              <a:t>: </a:t>
+              <a:t>: 4</a:t>
             </a:r>
           </a:p>
           <a:p>
@@ -4920,7 +4898,7 @@
             </a:r>
             <a:r>
               <a:rPr lang="en-US" sz="2400" dirty="0"/>
-              <a:t>:</a:t>
+              <a:t>: 5</a:t>
             </a:r>
           </a:p>
           <a:p>
@@ -4931,7 +4909,7 @@
             </a:pPr>
             <a:r>
               <a:rPr lang="de-DE" sz="2400" dirty="0"/>
-              <a:t>Regelmäßigkeit des Projektfortschritts: </a:t>
+              <a:t>Regelmäßigkeit des Projektfortschritts: 5</a:t>
             </a:r>
           </a:p>
           <a:p>
@@ -4942,7 +4920,7 @@
             </a:pPr>
             <a:r>
               <a:rPr lang="de-DE" sz="2400" dirty="0"/>
-              <a:t>Gleichauslastung aller Teammitglieder:</a:t>
+              <a:t>Gleichauslastung aller Teammitglieder: 5</a:t>
             </a:r>
           </a:p>
           <a:p>

</xml_diff>

<commit_message>
edited presentation and instructions
</commit_message>
<xml_diff>
--- a/Documentation/Präsentation.pptx
+++ b/Documentation/Präsentation.pptx
@@ -4,6 +4,9 @@
   <p:sldMasterIdLst>
     <p:sldMasterId id="2147483648" r:id="rId1"/>
   </p:sldMasterIdLst>
+  <p:notesMasterIdLst>
+    <p:notesMasterId r:id="rId7"/>
+  </p:notesMasterIdLst>
   <p:sldIdLst>
     <p:sldId id="256" r:id="rId2"/>
     <p:sldId id="257" r:id="rId3"/>
@@ -116,6 +119,689 @@
 </p:presentation>
 </file>
 
+<file path=ppt/notesMasters/notesMaster1.xml><?xml version="1.0" encoding="utf-8"?>
+<p:notesMaster xmlns:a="http://schemas.openxmlformats.org/drawingml/2006/main" xmlns:r="http://schemas.openxmlformats.org/officeDocument/2006/relationships" xmlns:p="http://schemas.openxmlformats.org/presentationml/2006/main">
+  <p:cSld>
+    <p:bg>
+      <p:bgRef idx="1001">
+        <a:schemeClr val="bg1"/>
+      </p:bgRef>
+    </p:bg>
+    <p:spTree>
+      <p:nvGrpSpPr>
+        <p:cNvPr id="1" name=""/>
+        <p:cNvGrpSpPr/>
+        <p:nvPr/>
+      </p:nvGrpSpPr>
+      <p:grpSpPr>
+        <a:xfrm>
+          <a:off x="0" y="0"/>
+          <a:ext cx="0" cy="0"/>
+          <a:chOff x="0" y="0"/>
+          <a:chExt cx="0" cy="0"/>
+        </a:xfrm>
+      </p:grpSpPr>
+      <p:sp>
+        <p:nvSpPr>
+          <p:cNvPr id="2" name="Kopfzeilenplatzhalter 1"/>
+          <p:cNvSpPr>
+            <a:spLocks noGrp="1"/>
+          </p:cNvSpPr>
+          <p:nvPr>
+            <p:ph type="hdr" sz="quarter"/>
+          </p:nvPr>
+        </p:nvSpPr>
+        <p:spPr>
+          <a:xfrm>
+            <a:off x="0" y="0"/>
+            <a:ext cx="2971800" cy="458788"/>
+          </a:xfrm>
+          <a:prstGeom prst="rect">
+            <a:avLst/>
+          </a:prstGeom>
+        </p:spPr>
+        <p:txBody>
+          <a:bodyPr vert="horz" lIns="91440" tIns="45720" rIns="91440" bIns="45720" rtlCol="0"/>
+          <a:lstStyle>
+            <a:lvl1pPr algn="l">
+              <a:defRPr sz="1200"/>
+            </a:lvl1pPr>
+          </a:lstStyle>
+          <a:p>
+            <a:endParaRPr lang="de-DE"/>
+          </a:p>
+        </p:txBody>
+      </p:sp>
+      <p:sp>
+        <p:nvSpPr>
+          <p:cNvPr id="3" name="Datumsplatzhalter 2"/>
+          <p:cNvSpPr>
+            <a:spLocks noGrp="1"/>
+          </p:cNvSpPr>
+          <p:nvPr>
+            <p:ph type="dt" idx="1"/>
+          </p:nvPr>
+        </p:nvSpPr>
+        <p:spPr>
+          <a:xfrm>
+            <a:off x="3884613" y="0"/>
+            <a:ext cx="2971800" cy="458788"/>
+          </a:xfrm>
+          <a:prstGeom prst="rect">
+            <a:avLst/>
+          </a:prstGeom>
+        </p:spPr>
+        <p:txBody>
+          <a:bodyPr vert="horz" lIns="91440" tIns="45720" rIns="91440" bIns="45720" rtlCol="0"/>
+          <a:lstStyle>
+            <a:lvl1pPr algn="r">
+              <a:defRPr sz="1200"/>
+            </a:lvl1pPr>
+          </a:lstStyle>
+          <a:p>
+            <a:fld id="{AE4D9AB5-32FF-4BC5-B291-A0FAF13C224A}" type="datetimeFigureOut">
+              <a:rPr lang="de-DE" smtClean="0"/>
+              <a:t>18.01.2022</a:t>
+            </a:fld>
+            <a:endParaRPr lang="de-DE"/>
+          </a:p>
+        </p:txBody>
+      </p:sp>
+      <p:sp>
+        <p:nvSpPr>
+          <p:cNvPr id="4" name="Folienbildplatzhalter 3"/>
+          <p:cNvSpPr>
+            <a:spLocks noGrp="1" noRot="1" noChangeAspect="1"/>
+          </p:cNvSpPr>
+          <p:nvPr>
+            <p:ph type="sldImg" idx="2"/>
+          </p:nvPr>
+        </p:nvSpPr>
+        <p:spPr>
+          <a:xfrm>
+            <a:off x="685800" y="1143000"/>
+            <a:ext cx="5486400" cy="3086100"/>
+          </a:xfrm>
+          <a:prstGeom prst="rect">
+            <a:avLst/>
+          </a:prstGeom>
+          <a:noFill/>
+          <a:ln w="12700">
+            <a:solidFill>
+              <a:prstClr val="black"/>
+            </a:solidFill>
+          </a:ln>
+        </p:spPr>
+        <p:txBody>
+          <a:bodyPr vert="horz" lIns="91440" tIns="45720" rIns="91440" bIns="45720" rtlCol="0" anchor="ctr"/>
+          <a:lstStyle/>
+          <a:p>
+            <a:endParaRPr lang="de-DE"/>
+          </a:p>
+        </p:txBody>
+      </p:sp>
+      <p:sp>
+        <p:nvSpPr>
+          <p:cNvPr id="5" name="Notizenplatzhalter 4"/>
+          <p:cNvSpPr>
+            <a:spLocks noGrp="1"/>
+          </p:cNvSpPr>
+          <p:nvPr>
+            <p:ph type="body" sz="quarter" idx="3"/>
+          </p:nvPr>
+        </p:nvSpPr>
+        <p:spPr>
+          <a:xfrm>
+            <a:off x="685800" y="4400550"/>
+            <a:ext cx="5486400" cy="3600450"/>
+          </a:xfrm>
+          <a:prstGeom prst="rect">
+            <a:avLst/>
+          </a:prstGeom>
+        </p:spPr>
+        <p:txBody>
+          <a:bodyPr vert="horz" lIns="91440" tIns="45720" rIns="91440" bIns="45720" rtlCol="0"/>
+          <a:lstStyle/>
+          <a:p>
+            <a:pPr lvl="0"/>
+            <a:r>
+              <a:rPr lang="de-DE"/>
+              <a:t>Mastertextformat bearbeiten</a:t>
+            </a:r>
+          </a:p>
+          <a:p>
+            <a:pPr lvl="1"/>
+            <a:r>
+              <a:rPr lang="de-DE"/>
+              <a:t>Zweite Ebene</a:t>
+            </a:r>
+          </a:p>
+          <a:p>
+            <a:pPr lvl="2"/>
+            <a:r>
+              <a:rPr lang="de-DE"/>
+              <a:t>Dritte Ebene</a:t>
+            </a:r>
+          </a:p>
+          <a:p>
+            <a:pPr lvl="3"/>
+            <a:r>
+              <a:rPr lang="de-DE"/>
+              <a:t>Vierte Ebene</a:t>
+            </a:r>
+          </a:p>
+          <a:p>
+            <a:pPr lvl="4"/>
+            <a:r>
+              <a:rPr lang="de-DE"/>
+              <a:t>Fünfte Ebene</a:t>
+            </a:r>
+          </a:p>
+        </p:txBody>
+      </p:sp>
+      <p:sp>
+        <p:nvSpPr>
+          <p:cNvPr id="6" name="Fußzeilenplatzhalter 5"/>
+          <p:cNvSpPr>
+            <a:spLocks noGrp="1"/>
+          </p:cNvSpPr>
+          <p:nvPr>
+            <p:ph type="ftr" sz="quarter" idx="4"/>
+          </p:nvPr>
+        </p:nvSpPr>
+        <p:spPr>
+          <a:xfrm>
+            <a:off x="0" y="8685213"/>
+            <a:ext cx="2971800" cy="458787"/>
+          </a:xfrm>
+          <a:prstGeom prst="rect">
+            <a:avLst/>
+          </a:prstGeom>
+        </p:spPr>
+        <p:txBody>
+          <a:bodyPr vert="horz" lIns="91440" tIns="45720" rIns="91440" bIns="45720" rtlCol="0" anchor="b"/>
+          <a:lstStyle>
+            <a:lvl1pPr algn="l">
+              <a:defRPr sz="1200"/>
+            </a:lvl1pPr>
+          </a:lstStyle>
+          <a:p>
+            <a:endParaRPr lang="de-DE"/>
+          </a:p>
+        </p:txBody>
+      </p:sp>
+      <p:sp>
+        <p:nvSpPr>
+          <p:cNvPr id="7" name="Foliennummernplatzhalter 6"/>
+          <p:cNvSpPr>
+            <a:spLocks noGrp="1"/>
+          </p:cNvSpPr>
+          <p:nvPr>
+            <p:ph type="sldNum" sz="quarter" idx="5"/>
+          </p:nvPr>
+        </p:nvSpPr>
+        <p:spPr>
+          <a:xfrm>
+            <a:off x="3884613" y="8685213"/>
+            <a:ext cx="2971800" cy="458787"/>
+          </a:xfrm>
+          <a:prstGeom prst="rect">
+            <a:avLst/>
+          </a:prstGeom>
+        </p:spPr>
+        <p:txBody>
+          <a:bodyPr vert="horz" lIns="91440" tIns="45720" rIns="91440" bIns="45720" rtlCol="0" anchor="b"/>
+          <a:lstStyle>
+            <a:lvl1pPr algn="r">
+              <a:defRPr sz="1200"/>
+            </a:lvl1pPr>
+          </a:lstStyle>
+          <a:p>
+            <a:fld id="{F2A897A5-F83D-4DA3-840C-1CD8C0401D2D}" type="slidenum">
+              <a:rPr lang="de-DE" smtClean="0"/>
+              <a:t>‹Nr.›</a:t>
+            </a:fld>
+            <a:endParaRPr lang="de-DE"/>
+          </a:p>
+        </p:txBody>
+      </p:sp>
+    </p:spTree>
+    <p:extLst>
+      <p:ext uri="{BB962C8B-B14F-4D97-AF65-F5344CB8AC3E}">
+        <p14:creationId xmlns:p14="http://schemas.microsoft.com/office/powerpoint/2010/main" val="318463406"/>
+      </p:ext>
+    </p:extLst>
+  </p:cSld>
+  <p:clrMap bg1="lt1" tx1="dk1" bg2="lt2" tx2="dk2" accent1="accent1" accent2="accent2" accent3="accent3" accent4="accent4" accent5="accent5" accent6="accent6" hlink="hlink" folHlink="folHlink"/>
+  <p:notesStyle>
+    <a:lvl1pPr marL="0" algn="l" defTabSz="914400" rtl="0" eaLnBrk="1" latinLnBrk="0" hangingPunct="1">
+      <a:defRPr sz="1200" kern="1200">
+        <a:solidFill>
+          <a:schemeClr val="tx1"/>
+        </a:solidFill>
+        <a:latin typeface="+mn-lt"/>
+        <a:ea typeface="+mn-ea"/>
+        <a:cs typeface="+mn-cs"/>
+      </a:defRPr>
+    </a:lvl1pPr>
+    <a:lvl2pPr marL="457200" algn="l" defTabSz="914400" rtl="0" eaLnBrk="1" latinLnBrk="0" hangingPunct="1">
+      <a:defRPr sz="1200" kern="1200">
+        <a:solidFill>
+          <a:schemeClr val="tx1"/>
+        </a:solidFill>
+        <a:latin typeface="+mn-lt"/>
+        <a:ea typeface="+mn-ea"/>
+        <a:cs typeface="+mn-cs"/>
+      </a:defRPr>
+    </a:lvl2pPr>
+    <a:lvl3pPr marL="914400" algn="l" defTabSz="914400" rtl="0" eaLnBrk="1" latinLnBrk="0" hangingPunct="1">
+      <a:defRPr sz="1200" kern="1200">
+        <a:solidFill>
+          <a:schemeClr val="tx1"/>
+        </a:solidFill>
+        <a:latin typeface="+mn-lt"/>
+        <a:ea typeface="+mn-ea"/>
+        <a:cs typeface="+mn-cs"/>
+      </a:defRPr>
+    </a:lvl3pPr>
+    <a:lvl4pPr marL="1371600" algn="l" defTabSz="914400" rtl="0" eaLnBrk="1" latinLnBrk="0" hangingPunct="1">
+      <a:defRPr sz="1200" kern="1200">
+        <a:solidFill>
+          <a:schemeClr val="tx1"/>
+        </a:solidFill>
+        <a:latin typeface="+mn-lt"/>
+        <a:ea typeface="+mn-ea"/>
+        <a:cs typeface="+mn-cs"/>
+      </a:defRPr>
+    </a:lvl4pPr>
+    <a:lvl5pPr marL="1828800" algn="l" defTabSz="914400" rtl="0" eaLnBrk="1" latinLnBrk="0" hangingPunct="1">
+      <a:defRPr sz="1200" kern="1200">
+        <a:solidFill>
+          <a:schemeClr val="tx1"/>
+        </a:solidFill>
+        <a:latin typeface="+mn-lt"/>
+        <a:ea typeface="+mn-ea"/>
+        <a:cs typeface="+mn-cs"/>
+      </a:defRPr>
+    </a:lvl5pPr>
+    <a:lvl6pPr marL="2286000" algn="l" defTabSz="914400" rtl="0" eaLnBrk="1" latinLnBrk="0" hangingPunct="1">
+      <a:defRPr sz="1200" kern="1200">
+        <a:solidFill>
+          <a:schemeClr val="tx1"/>
+        </a:solidFill>
+        <a:latin typeface="+mn-lt"/>
+        <a:ea typeface="+mn-ea"/>
+        <a:cs typeface="+mn-cs"/>
+      </a:defRPr>
+    </a:lvl6pPr>
+    <a:lvl7pPr marL="2743200" algn="l" defTabSz="914400" rtl="0" eaLnBrk="1" latinLnBrk="0" hangingPunct="1">
+      <a:defRPr sz="1200" kern="1200">
+        <a:solidFill>
+          <a:schemeClr val="tx1"/>
+        </a:solidFill>
+        <a:latin typeface="+mn-lt"/>
+        <a:ea typeface="+mn-ea"/>
+        <a:cs typeface="+mn-cs"/>
+      </a:defRPr>
+    </a:lvl7pPr>
+    <a:lvl8pPr marL="3200400" algn="l" defTabSz="914400" rtl="0" eaLnBrk="1" latinLnBrk="0" hangingPunct="1">
+      <a:defRPr sz="1200" kern="1200">
+        <a:solidFill>
+          <a:schemeClr val="tx1"/>
+        </a:solidFill>
+        <a:latin typeface="+mn-lt"/>
+        <a:ea typeface="+mn-ea"/>
+        <a:cs typeface="+mn-cs"/>
+      </a:defRPr>
+    </a:lvl8pPr>
+    <a:lvl9pPr marL="3657600" algn="l" defTabSz="914400" rtl="0" eaLnBrk="1" latinLnBrk="0" hangingPunct="1">
+      <a:defRPr sz="1200" kern="1200">
+        <a:solidFill>
+          <a:schemeClr val="tx1"/>
+        </a:solidFill>
+        <a:latin typeface="+mn-lt"/>
+        <a:ea typeface="+mn-ea"/>
+        <a:cs typeface="+mn-cs"/>
+      </a:defRPr>
+    </a:lvl9pPr>
+  </p:notesStyle>
+</p:notesMaster>
+</file>
+
+<file path=ppt/notesSlides/notesSlide1.xml><?xml version="1.0" encoding="utf-8"?>
+<p:notes xmlns:a="http://schemas.openxmlformats.org/drawingml/2006/main" xmlns:r="http://schemas.openxmlformats.org/officeDocument/2006/relationships" xmlns:p="http://schemas.openxmlformats.org/presentationml/2006/main">
+  <p:cSld>
+    <p:spTree>
+      <p:nvGrpSpPr>
+        <p:cNvPr id="1" name=""/>
+        <p:cNvGrpSpPr/>
+        <p:nvPr/>
+      </p:nvGrpSpPr>
+      <p:grpSpPr>
+        <a:xfrm>
+          <a:off x="0" y="0"/>
+          <a:ext cx="0" cy="0"/>
+          <a:chOff x="0" y="0"/>
+          <a:chExt cx="0" cy="0"/>
+        </a:xfrm>
+      </p:grpSpPr>
+      <p:sp>
+        <p:nvSpPr>
+          <p:cNvPr id="2" name="Folienbildplatzhalter 1"/>
+          <p:cNvSpPr>
+            <a:spLocks noGrp="1" noRot="1" noChangeAspect="1"/>
+          </p:cNvSpPr>
+          <p:nvPr>
+            <p:ph type="sldImg"/>
+          </p:nvPr>
+        </p:nvSpPr>
+        <p:spPr/>
+      </p:sp>
+      <p:sp>
+        <p:nvSpPr>
+          <p:cNvPr id="3" name="Notizenplatzhalter 2"/>
+          <p:cNvSpPr>
+            <a:spLocks noGrp="1"/>
+          </p:cNvSpPr>
+          <p:nvPr>
+            <p:ph type="body" idx="1"/>
+          </p:nvPr>
+        </p:nvSpPr>
+        <p:spPr/>
+        <p:txBody>
+          <a:bodyPr/>
+          <a:lstStyle/>
+          <a:p>
+            <a:r>
+              <a:rPr lang="de-DE" dirty="0"/>
+              <a:t>Startscreen</a:t>
+            </a:r>
+          </a:p>
+        </p:txBody>
+      </p:sp>
+      <p:sp>
+        <p:nvSpPr>
+          <p:cNvPr id="4" name="Foliennummernplatzhalter 3"/>
+          <p:cNvSpPr>
+            <a:spLocks noGrp="1"/>
+          </p:cNvSpPr>
+          <p:nvPr>
+            <p:ph type="sldNum" sz="quarter" idx="5"/>
+          </p:nvPr>
+        </p:nvSpPr>
+        <p:spPr/>
+        <p:txBody>
+          <a:bodyPr/>
+          <a:lstStyle/>
+          <a:p>
+            <a:fld id="{F2A897A5-F83D-4DA3-840C-1CD8C0401D2D}" type="slidenum">
+              <a:rPr lang="de-DE" smtClean="0"/>
+              <a:t>1</a:t>
+            </a:fld>
+            <a:endParaRPr lang="de-DE"/>
+          </a:p>
+        </p:txBody>
+      </p:sp>
+    </p:spTree>
+    <p:extLst>
+      <p:ext uri="{BB962C8B-B14F-4D97-AF65-F5344CB8AC3E}">
+        <p14:creationId xmlns:p14="http://schemas.microsoft.com/office/powerpoint/2010/main" val="1632821603"/>
+      </p:ext>
+    </p:extLst>
+  </p:cSld>
+  <p:clrMapOvr>
+    <a:masterClrMapping/>
+  </p:clrMapOvr>
+</p:notes>
+</file>
+
+<file path=ppt/notesSlides/notesSlide2.xml><?xml version="1.0" encoding="utf-8"?>
+<p:notes xmlns:a="http://schemas.openxmlformats.org/drawingml/2006/main" xmlns:r="http://schemas.openxmlformats.org/officeDocument/2006/relationships" xmlns:p="http://schemas.openxmlformats.org/presentationml/2006/main">
+  <p:cSld>
+    <p:spTree>
+      <p:nvGrpSpPr>
+        <p:cNvPr id="1" name=""/>
+        <p:cNvGrpSpPr/>
+        <p:nvPr/>
+      </p:nvGrpSpPr>
+      <p:grpSpPr>
+        <a:xfrm>
+          <a:off x="0" y="0"/>
+          <a:ext cx="0" cy="0"/>
+          <a:chOff x="0" y="0"/>
+          <a:chExt cx="0" cy="0"/>
+        </a:xfrm>
+      </p:grpSpPr>
+      <p:sp>
+        <p:nvSpPr>
+          <p:cNvPr id="2" name="Folienbildplatzhalter 1"/>
+          <p:cNvSpPr>
+            <a:spLocks noGrp="1" noRot="1" noChangeAspect="1"/>
+          </p:cNvSpPr>
+          <p:nvPr>
+            <p:ph type="sldImg"/>
+          </p:nvPr>
+        </p:nvSpPr>
+        <p:spPr/>
+      </p:sp>
+      <p:sp>
+        <p:nvSpPr>
+          <p:cNvPr id="3" name="Notizenplatzhalter 2"/>
+          <p:cNvSpPr>
+            <a:spLocks noGrp="1"/>
+          </p:cNvSpPr>
+          <p:nvPr>
+            <p:ph type="body" idx="1"/>
+          </p:nvPr>
+        </p:nvSpPr>
+        <p:spPr/>
+        <p:txBody>
+          <a:bodyPr/>
+          <a:lstStyle/>
+          <a:p>
+            <a:r>
+              <a:rPr lang="de-DE" dirty="0"/>
+              <a:t>Entscheidung zwischen Dungeon Crawler oder </a:t>
+            </a:r>
+            <a:r>
+              <a:rPr lang="de-DE" dirty="0" err="1"/>
+              <a:t>Platformer</a:t>
+            </a:r>
+            <a:r>
+              <a:rPr lang="de-DE" dirty="0"/>
+              <a:t> -&gt; </a:t>
+            </a:r>
+            <a:r>
+              <a:rPr lang="de-DE" dirty="0" err="1"/>
+              <a:t>Platformer</a:t>
+            </a:r>
+            <a:r>
+              <a:rPr lang="de-DE" dirty="0"/>
+              <a:t> ist besser umzusetzen</a:t>
+            </a:r>
+          </a:p>
+          <a:p>
+            <a:endParaRPr lang="de-DE" dirty="0"/>
+          </a:p>
+          <a:p>
+            <a:endParaRPr lang="de-DE" dirty="0"/>
+          </a:p>
+          <a:p>
+            <a:endParaRPr lang="de-DE" dirty="0"/>
+          </a:p>
+          <a:p>
+            <a:endParaRPr lang="de-DE" dirty="0"/>
+          </a:p>
+        </p:txBody>
+      </p:sp>
+      <p:sp>
+        <p:nvSpPr>
+          <p:cNvPr id="4" name="Foliennummernplatzhalter 3"/>
+          <p:cNvSpPr>
+            <a:spLocks noGrp="1"/>
+          </p:cNvSpPr>
+          <p:nvPr>
+            <p:ph type="sldNum" sz="quarter" idx="5"/>
+          </p:nvPr>
+        </p:nvSpPr>
+        <p:spPr/>
+        <p:txBody>
+          <a:bodyPr/>
+          <a:lstStyle/>
+          <a:p>
+            <a:fld id="{F2A897A5-F83D-4DA3-840C-1CD8C0401D2D}" type="slidenum">
+              <a:rPr lang="de-DE" smtClean="0"/>
+              <a:t>2</a:t>
+            </a:fld>
+            <a:endParaRPr lang="de-DE"/>
+          </a:p>
+        </p:txBody>
+      </p:sp>
+    </p:spTree>
+    <p:extLst>
+      <p:ext uri="{BB962C8B-B14F-4D97-AF65-F5344CB8AC3E}">
+        <p14:creationId xmlns:p14="http://schemas.microsoft.com/office/powerpoint/2010/main" val="949669375"/>
+      </p:ext>
+    </p:extLst>
+  </p:cSld>
+  <p:clrMapOvr>
+    <a:masterClrMapping/>
+  </p:clrMapOvr>
+</p:notes>
+</file>
+
+<file path=ppt/notesSlides/notesSlide3.xml><?xml version="1.0" encoding="utf-8"?>
+<p:notes xmlns:a="http://schemas.openxmlformats.org/drawingml/2006/main" xmlns:r="http://schemas.openxmlformats.org/officeDocument/2006/relationships" xmlns:p="http://schemas.openxmlformats.org/presentationml/2006/main">
+  <p:cSld>
+    <p:spTree>
+      <p:nvGrpSpPr>
+        <p:cNvPr id="1" name=""/>
+        <p:cNvGrpSpPr/>
+        <p:nvPr/>
+      </p:nvGrpSpPr>
+      <p:grpSpPr>
+        <a:xfrm>
+          <a:off x="0" y="0"/>
+          <a:ext cx="0" cy="0"/>
+          <a:chOff x="0" y="0"/>
+          <a:chExt cx="0" cy="0"/>
+        </a:xfrm>
+      </p:grpSpPr>
+      <p:sp>
+        <p:nvSpPr>
+          <p:cNvPr id="2" name="Folienbildplatzhalter 1"/>
+          <p:cNvSpPr>
+            <a:spLocks noGrp="1" noRot="1" noChangeAspect="1"/>
+          </p:cNvSpPr>
+          <p:nvPr>
+            <p:ph type="sldImg"/>
+          </p:nvPr>
+        </p:nvSpPr>
+        <p:spPr/>
+      </p:sp>
+      <p:sp>
+        <p:nvSpPr>
+          <p:cNvPr id="3" name="Notizenplatzhalter 2"/>
+          <p:cNvSpPr>
+            <a:spLocks noGrp="1"/>
+          </p:cNvSpPr>
+          <p:nvPr>
+            <p:ph type="body" idx="1"/>
+          </p:nvPr>
+        </p:nvSpPr>
+        <p:spPr/>
+        <p:txBody>
+          <a:bodyPr/>
+          <a:lstStyle/>
+          <a:p>
+            <a:pPr marL="228600" indent="-228600">
+              <a:buAutoNum type="alphaLcParenR"/>
+            </a:pPr>
+            <a:r>
+              <a:rPr lang="de-DE" dirty="0"/>
+              <a:t>Quantität des Ergebnisses (Erfüllung aller Ziele, technische Abgeschlossenheit) </a:t>
+            </a:r>
+          </a:p>
+          <a:p>
+            <a:pPr marL="228600" indent="-228600">
+              <a:buAutoNum type="alphaLcParenR"/>
+            </a:pPr>
+            <a:r>
+              <a:rPr lang="de-DE" dirty="0"/>
+              <a:t>Qualität des Ergebnisses (Zweckerfüllung, konzeptionell und gestalterisch) </a:t>
+            </a:r>
+          </a:p>
+          <a:p>
+            <a:pPr marL="228600" indent="-228600">
+              <a:buAutoNum type="alphaLcParenR"/>
+            </a:pPr>
+            <a:r>
+              <a:rPr lang="de-DE" dirty="0"/>
+              <a:t>Regelmäßigkeit des Projektfortschritts (Kontinuität ab dem Meilenstein „Kick-off“) </a:t>
+            </a:r>
+          </a:p>
+          <a:p>
+            <a:pPr marL="228600" indent="-228600">
+              <a:buAutoNum type="alphaLcParenR"/>
+            </a:pPr>
+            <a:r>
+              <a:rPr lang="de-DE" dirty="0"/>
+              <a:t>Gleichauslastung aller Teammitglieder (Ungefähre Vergleichbarkeit der Projektbeiträge)</a:t>
+            </a:r>
+          </a:p>
+          <a:p>
+            <a:pPr marL="0" indent="0">
+              <a:buNone/>
+            </a:pPr>
+            <a:endParaRPr lang="de-DE" dirty="0"/>
+          </a:p>
+          <a:p>
+            <a:pPr marL="0" indent="0">
+              <a:buNone/>
+            </a:pPr>
+            <a:r>
+              <a:rPr lang="de-DE" dirty="0"/>
+              <a:t>„Ingenieurwissenschaftlich-kritische“ Selbsteinschätzung erwartet!</a:t>
+            </a:r>
+          </a:p>
+        </p:txBody>
+      </p:sp>
+      <p:sp>
+        <p:nvSpPr>
+          <p:cNvPr id="4" name="Foliennummernplatzhalter 3"/>
+          <p:cNvSpPr>
+            <a:spLocks noGrp="1"/>
+          </p:cNvSpPr>
+          <p:nvPr>
+            <p:ph type="sldNum" sz="quarter" idx="5"/>
+          </p:nvPr>
+        </p:nvSpPr>
+        <p:spPr/>
+        <p:txBody>
+          <a:bodyPr/>
+          <a:lstStyle/>
+          <a:p>
+            <a:fld id="{F2A897A5-F83D-4DA3-840C-1CD8C0401D2D}" type="slidenum">
+              <a:rPr lang="de-DE" smtClean="0"/>
+              <a:t>4</a:t>
+            </a:fld>
+            <a:endParaRPr lang="de-DE"/>
+          </a:p>
+        </p:txBody>
+      </p:sp>
+    </p:spTree>
+    <p:extLst>
+      <p:ext uri="{BB962C8B-B14F-4D97-AF65-F5344CB8AC3E}">
+        <p14:creationId xmlns:p14="http://schemas.microsoft.com/office/powerpoint/2010/main" val="768113110"/>
+      </p:ext>
+    </p:extLst>
+  </p:cSld>
+  <p:clrMapOvr>
+    <a:masterClrMapping/>
+  </p:clrMapOvr>
+</p:notes>
+</file>
+
 <file path=ppt/slideLayouts/slideLayout1.xml><?xml version="1.0" encoding="utf-8"?>
 <p:sldLayout xmlns:a="http://schemas.openxmlformats.org/drawingml/2006/main" xmlns:r="http://schemas.openxmlformats.org/officeDocument/2006/relationships" xmlns:p="http://schemas.openxmlformats.org/presentationml/2006/main" type="title" preserve="1">
   <p:cSld name="Titelfolie">
@@ -263,7 +949,7 @@
           <a:p>
             <a:fld id="{299D2EC8-FD75-494B-956B-0BD0D9014E14}" type="datetimeFigureOut">
               <a:rPr lang="de-DE" smtClean="0"/>
-              <a:t>16.01.2022</a:t>
+              <a:t>18.01.2022</a:t>
             </a:fld>
             <a:endParaRPr lang="de-DE"/>
           </a:p>
@@ -461,7 +1147,7 @@
           <a:p>
             <a:fld id="{299D2EC8-FD75-494B-956B-0BD0D9014E14}" type="datetimeFigureOut">
               <a:rPr lang="de-DE" smtClean="0"/>
-              <a:t>16.01.2022</a:t>
+              <a:t>18.01.2022</a:t>
             </a:fld>
             <a:endParaRPr lang="de-DE"/>
           </a:p>
@@ -669,7 +1355,7 @@
           <a:p>
             <a:fld id="{299D2EC8-FD75-494B-956B-0BD0D9014E14}" type="datetimeFigureOut">
               <a:rPr lang="de-DE" smtClean="0"/>
-              <a:t>16.01.2022</a:t>
+              <a:t>18.01.2022</a:t>
             </a:fld>
             <a:endParaRPr lang="de-DE"/>
           </a:p>
@@ -867,7 +1553,7 @@
           <a:p>
             <a:fld id="{299D2EC8-FD75-494B-956B-0BD0D9014E14}" type="datetimeFigureOut">
               <a:rPr lang="de-DE" smtClean="0"/>
-              <a:t>16.01.2022</a:t>
+              <a:t>18.01.2022</a:t>
             </a:fld>
             <a:endParaRPr lang="de-DE"/>
           </a:p>
@@ -1142,7 +1828,7 @@
           <a:p>
             <a:fld id="{299D2EC8-FD75-494B-956B-0BD0D9014E14}" type="datetimeFigureOut">
               <a:rPr lang="de-DE" smtClean="0"/>
-              <a:t>16.01.2022</a:t>
+              <a:t>18.01.2022</a:t>
             </a:fld>
             <a:endParaRPr lang="de-DE"/>
           </a:p>
@@ -1407,7 +2093,7 @@
           <a:p>
             <a:fld id="{299D2EC8-FD75-494B-956B-0BD0D9014E14}" type="datetimeFigureOut">
               <a:rPr lang="de-DE" smtClean="0"/>
-              <a:t>16.01.2022</a:t>
+              <a:t>18.01.2022</a:t>
             </a:fld>
             <a:endParaRPr lang="de-DE"/>
           </a:p>
@@ -1819,7 +2505,7 @@
           <a:p>
             <a:fld id="{299D2EC8-FD75-494B-956B-0BD0D9014E14}" type="datetimeFigureOut">
               <a:rPr lang="de-DE" smtClean="0"/>
-              <a:t>16.01.2022</a:t>
+              <a:t>18.01.2022</a:t>
             </a:fld>
             <a:endParaRPr lang="de-DE"/>
           </a:p>
@@ -1960,7 +2646,7 @@
           <a:p>
             <a:fld id="{299D2EC8-FD75-494B-956B-0BD0D9014E14}" type="datetimeFigureOut">
               <a:rPr lang="de-DE" smtClean="0"/>
-              <a:t>16.01.2022</a:t>
+              <a:t>18.01.2022</a:t>
             </a:fld>
             <a:endParaRPr lang="de-DE"/>
           </a:p>
@@ -2073,7 +2759,7 @@
           <a:p>
             <a:fld id="{299D2EC8-FD75-494B-956B-0BD0D9014E14}" type="datetimeFigureOut">
               <a:rPr lang="de-DE" smtClean="0"/>
-              <a:t>16.01.2022</a:t>
+              <a:t>18.01.2022</a:t>
             </a:fld>
             <a:endParaRPr lang="de-DE"/>
           </a:p>
@@ -2384,7 +3070,7 @@
           <a:p>
             <a:fld id="{299D2EC8-FD75-494B-956B-0BD0D9014E14}" type="datetimeFigureOut">
               <a:rPr lang="de-DE" smtClean="0"/>
-              <a:t>16.01.2022</a:t>
+              <a:t>18.01.2022</a:t>
             </a:fld>
             <a:endParaRPr lang="de-DE"/>
           </a:p>
@@ -2672,7 +3358,7 @@
           <a:p>
             <a:fld id="{299D2EC8-FD75-494B-956B-0BD0D9014E14}" type="datetimeFigureOut">
               <a:rPr lang="de-DE" smtClean="0"/>
-              <a:t>16.01.2022</a:t>
+              <a:t>18.01.2022</a:t>
             </a:fld>
             <a:endParaRPr lang="de-DE"/>
           </a:p>
@@ -2913,7 +3599,7 @@
           <a:p>
             <a:fld id="{299D2EC8-FD75-494B-956B-0BD0D9014E14}" type="datetimeFigureOut">
               <a:rPr lang="de-DE" smtClean="0"/>
-              <a:t>16.01.2022</a:t>
+              <a:t>18.01.2022</a:t>
             </a:fld>
             <a:endParaRPr lang="de-DE"/>
           </a:p>
@@ -3395,7 +4081,7 @@
           <p:nvPr/>
         </p:nvPicPr>
         <p:blipFill>
-          <a:blip r:embed="rId2">
+          <a:blip r:embed="rId3">
             <a:extLst>
               <a:ext uri="{28A0092B-C50C-407E-A947-70E740481C1C}">
                 <a14:useLocalDpi xmlns:a14="http://schemas.microsoft.com/office/drawing/2010/main" val="0"/>
@@ -3579,7 +4265,7 @@
               <a:rPr lang="de-DE" sz="2600" dirty="0">
                 <a:latin typeface="Unispace" panose="02000809060000020004" pitchFamily="49" charset="0"/>
               </a:rPr>
-              <a:t>Elisabeth V.</a:t>
+              <a:t>Elizabeth V.</a:t>
             </a:r>
           </a:p>
           <a:p>
@@ -3728,7 +4414,7 @@
           </p:nvPr>
         </p:nvPicPr>
         <p:blipFill rotWithShape="1">
-          <a:blip r:embed="rId2">
+          <a:blip r:embed="rId3">
             <a:extLst>
               <a:ext uri="{28A0092B-C50C-407E-A947-70E740481C1C}">
                 <a14:useLocalDpi xmlns:a14="http://schemas.microsoft.com/office/drawing/2010/main" val="0"/>
@@ -5084,7 +5770,7 @@
           <p:nvPr/>
         </p:nvPicPr>
         <p:blipFill>
-          <a:blip r:embed="rId2">
+          <a:blip r:embed="rId3">
             <a:extLst>
               <a:ext uri="{28A0092B-C50C-407E-A947-70E740481C1C}">
                 <a14:useLocalDpi xmlns:a14="http://schemas.microsoft.com/office/drawing/2010/main" val="0"/>
@@ -5713,4 +6399,299 @@
     </a:ext>
   </a:extLst>
 </a:theme>
+</file>
+
+<file path=ppt/theme/theme2.xml><?xml version="1.0" encoding="utf-8"?>
+<a:theme xmlns:a="http://schemas.openxmlformats.org/drawingml/2006/main" name="Office">
+  <a:themeElements>
+    <a:clrScheme name="Office">
+      <a:dk1>
+        <a:sysClr val="windowText" lastClr="000000"/>
+      </a:dk1>
+      <a:lt1>
+        <a:sysClr val="window" lastClr="FFFFFF"/>
+      </a:lt1>
+      <a:dk2>
+        <a:srgbClr val="44546A"/>
+      </a:dk2>
+      <a:lt2>
+        <a:srgbClr val="E7E6E6"/>
+      </a:lt2>
+      <a:accent1>
+        <a:srgbClr val="4472C4"/>
+      </a:accent1>
+      <a:accent2>
+        <a:srgbClr val="ED7D31"/>
+      </a:accent2>
+      <a:accent3>
+        <a:srgbClr val="A5A5A5"/>
+      </a:accent3>
+      <a:accent4>
+        <a:srgbClr val="FFC000"/>
+      </a:accent4>
+      <a:accent5>
+        <a:srgbClr val="5B9BD5"/>
+      </a:accent5>
+      <a:accent6>
+        <a:srgbClr val="70AD47"/>
+      </a:accent6>
+      <a:hlink>
+        <a:srgbClr val="0563C1"/>
+      </a:hlink>
+      <a:folHlink>
+        <a:srgbClr val="954F72"/>
+      </a:folHlink>
+    </a:clrScheme>
+    <a:fontScheme name="Office">
+      <a:majorFont>
+        <a:latin typeface="Calibri Light" panose="020F0302020204030204"/>
+        <a:ea typeface=""/>
+        <a:cs typeface=""/>
+        <a:font script="Jpan" typeface="游ゴシック Light"/>
+        <a:font script="Hang" typeface="맑은 고딕"/>
+        <a:font script="Hans" typeface="等线 Light"/>
+        <a:font script="Hant" typeface="新細明體"/>
+        <a:font script="Arab" typeface="Times New Roman"/>
+        <a:font script="Hebr" typeface="Times New Roman"/>
+        <a:font script="Thai" typeface="Angsana New"/>
+        <a:font script="Ethi" typeface="Nyala"/>
+        <a:font script="Beng" typeface="Vrinda"/>
+        <a:font script="Gujr" typeface="Shruti"/>
+        <a:font script="Khmr" typeface="MoolBoran"/>
+        <a:font script="Knda" typeface="Tunga"/>
+        <a:font script="Guru" typeface="Raavi"/>
+        <a:font script="Cans" typeface="Euphemia"/>
+        <a:font script="Cher" typeface="Plantagenet Cherokee"/>
+        <a:font script="Yiii" typeface="Microsoft Yi Baiti"/>
+        <a:font script="Tibt" typeface="Microsoft Himalaya"/>
+        <a:font script="Thaa" typeface="MV Boli"/>
+        <a:font script="Deva" typeface="Mangal"/>
+        <a:font script="Telu" typeface="Gautami"/>
+        <a:font script="Taml" typeface="Latha"/>
+        <a:font script="Syrc" typeface="Estrangelo Edessa"/>
+        <a:font script="Orya" typeface="Kalinga"/>
+        <a:font script="Mlym" typeface="Kartika"/>
+        <a:font script="Laoo" typeface="DokChampa"/>
+        <a:font script="Sinh" typeface="Iskoola Pota"/>
+        <a:font script="Mong" typeface="Mongolian Baiti"/>
+        <a:font script="Viet" typeface="Times New Roman"/>
+        <a:font script="Uigh" typeface="Microsoft Uighur"/>
+        <a:font script="Geor" typeface="Sylfaen"/>
+        <a:font script="Armn" typeface="Arial"/>
+        <a:font script="Bugi" typeface="Leelawadee UI"/>
+        <a:font script="Bopo" typeface="Microsoft JhengHei"/>
+        <a:font script="Java" typeface="Javanese Text"/>
+        <a:font script="Lisu" typeface="Segoe UI"/>
+        <a:font script="Mymr" typeface="Myanmar Text"/>
+        <a:font script="Nkoo" typeface="Ebrima"/>
+        <a:font script="Olck" typeface="Nirmala UI"/>
+        <a:font script="Osma" typeface="Ebrima"/>
+        <a:font script="Phag" typeface="Phagspa"/>
+        <a:font script="Syrn" typeface="Estrangelo Edessa"/>
+        <a:font script="Syrj" typeface="Estrangelo Edessa"/>
+        <a:font script="Syre" typeface="Estrangelo Edessa"/>
+        <a:font script="Sora" typeface="Nirmala UI"/>
+        <a:font script="Tale" typeface="Microsoft Tai Le"/>
+        <a:font script="Talu" typeface="Microsoft New Tai Lue"/>
+        <a:font script="Tfng" typeface="Ebrima"/>
+      </a:majorFont>
+      <a:minorFont>
+        <a:latin typeface="Calibri" panose="020F0502020204030204"/>
+        <a:ea typeface=""/>
+        <a:cs typeface=""/>
+        <a:font script="Jpan" typeface="游ゴシック"/>
+        <a:font script="Hang" typeface="맑은 고딕"/>
+        <a:font script="Hans" typeface="等线"/>
+        <a:font script="Hant" typeface="新細明體"/>
+        <a:font script="Arab" typeface="Arial"/>
+        <a:font script="Hebr" typeface="Arial"/>
+        <a:font script="Thai" typeface="Cordia New"/>
+        <a:font script="Ethi" typeface="Nyala"/>
+        <a:font script="Beng" typeface="Vrinda"/>
+        <a:font script="Gujr" typeface="Shruti"/>
+        <a:font script="Khmr" typeface="DaunPenh"/>
+        <a:font script="Knda" typeface="Tunga"/>
+        <a:font script="Guru" typeface="Raavi"/>
+        <a:font script="Cans" typeface="Euphemia"/>
+        <a:font script="Cher" typeface="Plantagenet Cherokee"/>
+        <a:font script="Yiii" typeface="Microsoft Yi Baiti"/>
+        <a:font script="Tibt" typeface="Microsoft Himalaya"/>
+        <a:font script="Thaa" typeface="MV Boli"/>
+        <a:font script="Deva" typeface="Mangal"/>
+        <a:font script="Telu" typeface="Gautami"/>
+        <a:font script="Taml" typeface="Latha"/>
+        <a:font script="Syrc" typeface="Estrangelo Edessa"/>
+        <a:font script="Orya" typeface="Kalinga"/>
+        <a:font script="Mlym" typeface="Kartika"/>
+        <a:font script="Laoo" typeface="DokChampa"/>
+        <a:font script="Sinh" typeface="Iskoola Pota"/>
+        <a:font script="Mong" typeface="Mongolian Baiti"/>
+        <a:font script="Viet" typeface="Arial"/>
+        <a:font script="Uigh" typeface="Microsoft Uighur"/>
+        <a:font script="Geor" typeface="Sylfaen"/>
+        <a:font script="Armn" typeface="Arial"/>
+        <a:font script="Bugi" typeface="Leelawadee UI"/>
+        <a:font script="Bopo" typeface="Microsoft JhengHei"/>
+        <a:font script="Java" typeface="Javanese Text"/>
+        <a:font script="Lisu" typeface="Segoe UI"/>
+        <a:font script="Mymr" typeface="Myanmar Text"/>
+        <a:font script="Nkoo" typeface="Ebrima"/>
+        <a:font script="Olck" typeface="Nirmala UI"/>
+        <a:font script="Osma" typeface="Ebrima"/>
+        <a:font script="Phag" typeface="Phagspa"/>
+        <a:font script="Syrn" typeface="Estrangelo Edessa"/>
+        <a:font script="Syrj" typeface="Estrangelo Edessa"/>
+        <a:font script="Syre" typeface="Estrangelo Edessa"/>
+        <a:font script="Sora" typeface="Nirmala UI"/>
+        <a:font script="Tale" typeface="Microsoft Tai Le"/>
+        <a:font script="Talu" typeface="Microsoft New Tai Lue"/>
+        <a:font script="Tfng" typeface="Ebrima"/>
+      </a:minorFont>
+    </a:fontScheme>
+    <a:fmtScheme name="Office">
+      <a:fillStyleLst>
+        <a:solidFill>
+          <a:schemeClr val="phClr"/>
+        </a:solidFill>
+        <a:gradFill rotWithShape="1">
+          <a:gsLst>
+            <a:gs pos="0">
+              <a:schemeClr val="phClr">
+                <a:lumMod val="110000"/>
+                <a:satMod val="105000"/>
+                <a:tint val="67000"/>
+              </a:schemeClr>
+            </a:gs>
+            <a:gs pos="50000">
+              <a:schemeClr val="phClr">
+                <a:lumMod val="105000"/>
+                <a:satMod val="103000"/>
+                <a:tint val="73000"/>
+              </a:schemeClr>
+            </a:gs>
+            <a:gs pos="100000">
+              <a:schemeClr val="phClr">
+                <a:lumMod val="105000"/>
+                <a:satMod val="109000"/>
+                <a:tint val="81000"/>
+              </a:schemeClr>
+            </a:gs>
+          </a:gsLst>
+          <a:lin ang="5400000" scaled="0"/>
+        </a:gradFill>
+        <a:gradFill rotWithShape="1">
+          <a:gsLst>
+            <a:gs pos="0">
+              <a:schemeClr val="phClr">
+                <a:satMod val="103000"/>
+                <a:lumMod val="102000"/>
+                <a:tint val="94000"/>
+              </a:schemeClr>
+            </a:gs>
+            <a:gs pos="50000">
+              <a:schemeClr val="phClr">
+                <a:satMod val="110000"/>
+                <a:lumMod val="100000"/>
+                <a:shade val="100000"/>
+              </a:schemeClr>
+            </a:gs>
+            <a:gs pos="100000">
+              <a:schemeClr val="phClr">
+                <a:lumMod val="99000"/>
+                <a:satMod val="120000"/>
+                <a:shade val="78000"/>
+              </a:schemeClr>
+            </a:gs>
+          </a:gsLst>
+          <a:lin ang="5400000" scaled="0"/>
+        </a:gradFill>
+      </a:fillStyleLst>
+      <a:lnStyleLst>
+        <a:ln w="6350" cap="flat" cmpd="sng" algn="ctr">
+          <a:solidFill>
+            <a:schemeClr val="phClr"/>
+          </a:solidFill>
+          <a:prstDash val="solid"/>
+          <a:miter lim="800000"/>
+        </a:ln>
+        <a:ln w="12700" cap="flat" cmpd="sng" algn="ctr">
+          <a:solidFill>
+            <a:schemeClr val="phClr"/>
+          </a:solidFill>
+          <a:prstDash val="solid"/>
+          <a:miter lim="800000"/>
+        </a:ln>
+        <a:ln w="19050" cap="flat" cmpd="sng" algn="ctr">
+          <a:solidFill>
+            <a:schemeClr val="phClr"/>
+          </a:solidFill>
+          <a:prstDash val="solid"/>
+          <a:miter lim="800000"/>
+        </a:ln>
+      </a:lnStyleLst>
+      <a:effectStyleLst>
+        <a:effectStyle>
+          <a:effectLst/>
+        </a:effectStyle>
+        <a:effectStyle>
+          <a:effectLst/>
+        </a:effectStyle>
+        <a:effectStyle>
+          <a:effectLst>
+            <a:outerShdw blurRad="57150" dist="19050" dir="5400000" algn="ctr" rotWithShape="0">
+              <a:srgbClr val="000000">
+                <a:alpha val="63000"/>
+              </a:srgbClr>
+            </a:outerShdw>
+          </a:effectLst>
+        </a:effectStyle>
+      </a:effectStyleLst>
+      <a:bgFillStyleLst>
+        <a:solidFill>
+          <a:schemeClr val="phClr"/>
+        </a:solidFill>
+        <a:solidFill>
+          <a:schemeClr val="phClr">
+            <a:tint val="95000"/>
+            <a:satMod val="170000"/>
+          </a:schemeClr>
+        </a:solidFill>
+        <a:gradFill rotWithShape="1">
+          <a:gsLst>
+            <a:gs pos="0">
+              <a:schemeClr val="phClr">
+                <a:tint val="93000"/>
+                <a:satMod val="150000"/>
+                <a:shade val="98000"/>
+                <a:lumMod val="102000"/>
+              </a:schemeClr>
+            </a:gs>
+            <a:gs pos="50000">
+              <a:schemeClr val="phClr">
+                <a:tint val="98000"/>
+                <a:satMod val="130000"/>
+                <a:shade val="90000"/>
+                <a:lumMod val="103000"/>
+              </a:schemeClr>
+            </a:gs>
+            <a:gs pos="100000">
+              <a:schemeClr val="phClr">
+                <a:shade val="63000"/>
+                <a:satMod val="120000"/>
+              </a:schemeClr>
+            </a:gs>
+          </a:gsLst>
+          <a:lin ang="5400000" scaled="0"/>
+        </a:gradFill>
+      </a:bgFillStyleLst>
+    </a:fmtScheme>
+  </a:themeElements>
+  <a:objectDefaults/>
+  <a:extraClrSchemeLst/>
+  <a:extLst>
+    <a:ext uri="{05A4C25C-085E-4340-85A3-A5531E510DB2}">
+      <thm15:themeFamily xmlns:thm15="http://schemas.microsoft.com/office/thememl/2012/main" name="Office Theme" id="{62F939B6-93AF-4DB8-9C6B-D6C7DFDC589F}" vid="{4A3C46E8-61CC-4603-A589-7422A47A8E4A}"/>
+    </a:ext>
+  </a:extLst>
+</a:theme>
 </file>
</xml_diff>